<commit_message>
really want to update the rules
</commit_message>
<xml_diff>
--- a/Power PREP.pptx
+++ b/Power PREP.pptx
@@ -233,7 +233,7 @@
           <a:p>
             <a:fld id="{FE5B4EDC-59C0-49C7-8ADA-5A781B329E02}" type="datetimeFigureOut">
               <a:rPr lang="en-US"/>
-              <a:t>9/17/2017</a:t>
+              <a:t>9/25/2017</a:t>
             </a:fld>
             <a:endParaRPr/>
           </a:p>
@@ -398,7 +398,7 @@
           <a:p>
             <a:fld id="{F2D8D46A-B586-417D-BFBD-8C8FE0AAF762}" type="datetimeFigureOut">
               <a:rPr lang="en-US"/>
-              <a:t>9/17/2017</a:t>
+              <a:t>9/25/2017</a:t>
             </a:fld>
             <a:endParaRPr/>
           </a:p>
@@ -1435,7 +1435,7 @@
           <a:p>
             <a:fld id="{F0DFD029-FB74-4578-B929-F66AA97659CA}" type="datetimeFigureOut">
               <a:rPr lang="en-US"/>
-              <a:t>9/17/2017</a:t>
+              <a:t>9/25/2017</a:t>
             </a:fld>
             <a:endParaRPr/>
           </a:p>
@@ -1633,7 +1633,7 @@
           <a:p>
             <a:fld id="{F0DFD029-FB74-4578-B929-F66AA97659CA}" type="datetimeFigureOut">
               <a:rPr lang="en-US"/>
-              <a:t>9/17/2017</a:t>
+              <a:t>9/25/2017</a:t>
             </a:fld>
             <a:endParaRPr/>
           </a:p>
@@ -1841,7 +1841,7 @@
           <a:p>
             <a:fld id="{F0DFD029-FB74-4578-B929-F66AA97659CA}" type="datetimeFigureOut">
               <a:rPr lang="en-US"/>
-              <a:t>9/17/2017</a:t>
+              <a:t>9/25/2017</a:t>
             </a:fld>
             <a:endParaRPr/>
           </a:p>
@@ -2065,7 +2065,7 @@
           <a:p>
             <a:fld id="{F0DFD029-FB74-4578-B929-F66AA97659CA}" type="datetimeFigureOut">
               <a:rPr lang="en-US"/>
-              <a:t>9/17/2017</a:t>
+              <a:t>9/25/2017</a:t>
             </a:fld>
             <a:endParaRPr/>
           </a:p>
@@ -2497,7 +2497,7 @@
           <a:p>
             <a:fld id="{F0DFD029-FB74-4578-B929-F66AA97659CA}" type="datetimeFigureOut">
               <a:rPr lang="en-US"/>
-              <a:t>9/17/2017</a:t>
+              <a:t>9/25/2017</a:t>
             </a:fld>
             <a:endParaRPr/>
           </a:p>
@@ -2801,7 +2801,7 @@
           <a:p>
             <a:fld id="{F0DFD029-FB74-4578-B929-F66AA97659CA}" type="datetimeFigureOut">
               <a:rPr lang="en-US"/>
-              <a:t>9/17/2017</a:t>
+              <a:t>9/25/2017</a:t>
             </a:fld>
             <a:endParaRPr/>
           </a:p>
@@ -3257,7 +3257,7 @@
           <a:p>
             <a:fld id="{F0DFD029-FB74-4578-B929-F66AA97659CA}" type="datetimeFigureOut">
               <a:rPr lang="en-US"/>
-              <a:t>9/17/2017</a:t>
+              <a:t>9/25/2017</a:t>
             </a:fld>
             <a:endParaRPr/>
           </a:p>
@@ -3387,7 +3387,7 @@
           <a:p>
             <a:fld id="{F0DFD029-FB74-4578-B929-F66AA97659CA}" type="datetimeFigureOut">
               <a:rPr lang="en-US"/>
-              <a:t>9/17/2017</a:t>
+              <a:t>9/25/2017</a:t>
             </a:fld>
             <a:endParaRPr/>
           </a:p>
@@ -3494,7 +3494,7 @@
           <a:p>
             <a:fld id="{F0DFD029-FB74-4578-B929-F66AA97659CA}" type="datetimeFigureOut">
               <a:rPr lang="en-US"/>
-              <a:t>9/17/2017</a:t>
+              <a:t>9/25/2017</a:t>
             </a:fld>
             <a:endParaRPr/>
           </a:p>
@@ -3793,7 +3793,7 @@
           <a:p>
             <a:fld id="{F0DFD029-FB74-4578-B929-F66AA97659CA}" type="datetimeFigureOut">
               <a:rPr lang="en-US"/>
-              <a:t>9/17/2017</a:t>
+              <a:t>9/25/2017</a:t>
             </a:fld>
             <a:endParaRPr/>
           </a:p>
@@ -4081,7 +4081,7 @@
           <a:p>
             <a:fld id="{F0DFD029-FB74-4578-B929-F66AA97659CA}" type="datetimeFigureOut">
               <a:rPr lang="en-US"/>
-              <a:t>9/17/2017</a:t>
+              <a:t>9/25/2017</a:t>
             </a:fld>
             <a:endParaRPr/>
           </a:p>
@@ -4713,7 +4713,7 @@
             <a:fld id="{F0DFD029-FB74-4578-B929-F66AA97659CA}" type="datetimeFigureOut">
               <a:rPr lang="en-US"/>
               <a:pPr/>
-              <a:t>9/17/2017</a:t>
+              <a:t>9/25/2017</a:t>
             </a:fld>
             <a:endParaRPr/>
           </a:p>
@@ -5357,7 +5357,7 @@
           <a:p>
             <a:r>
               <a:rPr lang="en-US" dirty="0"/>
-              <a:t>You must design a ROBOT to deposit COINS in SLOTS</a:t>
+              <a:t>You must design a ROBOT to start a GAME MACHINE by depositing COINS in SLOTS</a:t>
             </a:r>
           </a:p>
           <a:p>
@@ -5403,20 +5403,20 @@
           </p:nvPr>
         </p:nvPicPr>
         <p:blipFill rotWithShape="1">
-          <a:blip r:embed="rId2" cstate="screen">
+          <a:blip r:embed="rId2">
             <a:extLst>
               <a:ext uri="{28A0092B-C50C-407E-A947-70E740481C1C}">
-                <a14:useLocalDpi xmlns:a14="http://schemas.microsoft.com/office/drawing/2010/main"/>
+                <a14:useLocalDpi xmlns:a14="http://schemas.microsoft.com/office/drawing/2010/main" val="0"/>
               </a:ext>
             </a:extLst>
           </a:blip>
-          <a:srcRect/>
+          <a:srcRect l="25034" r="24899"/>
           <a:stretch/>
         </p:blipFill>
         <p:spPr>
           <a:xfrm>
-            <a:off x="6475411" y="1706880"/>
-            <a:ext cx="5174654" cy="4403863"/>
+            <a:off x="6627812" y="1600200"/>
+            <a:ext cx="4796257" cy="4869860"/>
           </a:xfrm>
         </p:spPr>
       </p:pic>
@@ -5462,6 +5462,40 @@
           <a:chExt cx="0" cy="0"/>
         </a:xfrm>
       </p:grpSpPr>
+      <p:pic>
+        <p:nvPicPr>
+          <p:cNvPr id="10" name="Content Placeholder 9">
+            <a:extLst>
+              <a:ext uri="{FF2B5EF4-FFF2-40B4-BE49-F238E27FC236}">
+                <a16:creationId xmlns:a16="http://schemas.microsoft.com/office/drawing/2014/main" id="{E4E9FD51-8CC9-4BAB-BBC8-6EFE2A37FBA4}"/>
+              </a:ext>
+            </a:extLst>
+          </p:cNvPr>
+          <p:cNvPicPr>
+            <a:picLocks noGrp="1" noChangeAspect="1"/>
+          </p:cNvPicPr>
+          <p:nvPr>
+            <p:ph sz="half" idx="1"/>
+          </p:nvPr>
+        </p:nvPicPr>
+        <p:blipFill rotWithShape="1">
+          <a:blip r:embed="rId2">
+            <a:extLst>
+              <a:ext uri="{28A0092B-C50C-407E-A947-70E740481C1C}">
+                <a14:useLocalDpi xmlns:a14="http://schemas.microsoft.com/office/drawing/2010/main" val="0"/>
+              </a:ext>
+            </a:extLst>
+          </a:blip>
+          <a:srcRect l="35980" t="15472" r="14505" b="7786"/>
+          <a:stretch/>
+        </p:blipFill>
+        <p:spPr>
+          <a:xfrm>
+            <a:off x="1229736" y="1926366"/>
+            <a:ext cx="4743377" cy="3737228"/>
+          </a:xfrm>
+        </p:spPr>
+      </p:pic>
       <p:sp>
         <p:nvSpPr>
           <p:cNvPr id="2" name="Title 1"/>
@@ -5500,40 +5534,6 @@
           </a:p>
         </p:txBody>
       </p:sp>
-      <p:pic>
-        <p:nvPicPr>
-          <p:cNvPr id="6" name="Content Placeholder 5">
-            <a:extLst>
-              <a:ext uri="{FF2B5EF4-FFF2-40B4-BE49-F238E27FC236}">
-                <a16:creationId xmlns:a16="http://schemas.microsoft.com/office/drawing/2014/main" id="{26739B0C-FEF8-4329-994C-BC1ECD0E4AD2}"/>
-              </a:ext>
-            </a:extLst>
-          </p:cNvPr>
-          <p:cNvPicPr>
-            <a:picLocks noGrp="1" noChangeAspect="1"/>
-          </p:cNvPicPr>
-          <p:nvPr>
-            <p:ph sz="half" idx="1"/>
-          </p:nvPr>
-        </p:nvPicPr>
-        <p:blipFill rotWithShape="1">
-          <a:blip r:embed="rId2" cstate="screen">
-            <a:extLst>
-              <a:ext uri="{28A0092B-C50C-407E-A947-70E740481C1C}">
-                <a14:useLocalDpi xmlns:a14="http://schemas.microsoft.com/office/drawing/2010/main"/>
-              </a:ext>
-            </a:extLst>
-          </a:blip>
-          <a:srcRect/>
-          <a:stretch/>
-        </p:blipFill>
-        <p:spPr>
-          <a:xfrm>
-            <a:off x="684212" y="1706880"/>
-            <a:ext cx="5605835" cy="4869860"/>
-          </a:xfrm>
-        </p:spPr>
-      </p:pic>
       <p:sp>
         <p:nvSpPr>
           <p:cNvPr id="4" name="Content Placeholder 3"/>
@@ -5547,12 +5547,18 @@
         <p:spPr/>
         <p:txBody>
           <a:bodyPr>
-            <a:normAutofit fontScale="92500" lnSpcReduction="20000"/>
+            <a:normAutofit fontScale="70000" lnSpcReduction="20000"/>
           </a:bodyPr>
           <a:lstStyle/>
           <a:p>
             <a:r>
               <a:rPr lang="en-US" dirty="0"/>
+              <a:t>The VERTICAL SLOT is worth 50 points for each COIN deposited</a:t>
+            </a:r>
+          </a:p>
+          <a:p>
+            <a:r>
+              <a:rPr lang="en-US" dirty="0"/>
               <a:t>The HIGH SLOT is worth 25 POINTS for each COIN deposited</a:t>
             </a:r>
           </a:p>
@@ -5571,7 +5577,20 @@
           <a:p>
             <a:r>
               <a:rPr lang="en-US" dirty="0"/>
-              <a:t>RETROREFLECTIVE TAPE has been applied to the HIGH SLOT to assist ROBOTS in scoring POINTS</a:t>
+              <a:t>RETROREFLECTIVE TAPE has been applied to assist ROBOTS in scoring POINTS</a:t>
+            </a:r>
+          </a:p>
+          <a:p>
+            <a:r>
+              <a:rPr lang="en-US" dirty="0"/>
+              <a:t>The GAME needs 100 POINTS minimum to START UP</a:t>
+            </a:r>
+          </a:p>
+          <a:p>
+            <a:pPr lvl="1"/>
+            <a:r>
+              <a:rPr lang="en-US" dirty="0"/>
+              <a:t>Every 50 points after START UP grants one RANKING POINT</a:t>
             </a:r>
           </a:p>
         </p:txBody>
@@ -5590,7 +5609,7 @@
         </p:nvSpPr>
         <p:spPr>
           <a:xfrm>
-            <a:off x="2284412" y="3384312"/>
+            <a:off x="2970212" y="3939540"/>
             <a:ext cx="3159839" cy="584775"/>
           </a:xfrm>
           <a:prstGeom prst="rect">
@@ -5644,7 +5663,7 @@
         </p:nvSpPr>
         <p:spPr>
           <a:xfrm>
-            <a:off x="2463947" y="5131980"/>
+            <a:off x="3046412" y="5397787"/>
             <a:ext cx="2800768" cy="531614"/>
           </a:xfrm>
           <a:prstGeom prst="rect">
@@ -5697,6 +5716,60 @@
               </a:effectLst>
               <a:latin typeface="Code 7x5" panose="00000400000000000000" pitchFamily="2" charset="0"/>
             </a:endParaRPr>
+          </a:p>
+        </p:txBody>
+      </p:sp>
+      <p:sp>
+        <p:nvSpPr>
+          <p:cNvPr id="11" name="Rectangle 10">
+            <a:extLst>
+              <a:ext uri="{FF2B5EF4-FFF2-40B4-BE49-F238E27FC236}">
+                <a16:creationId xmlns:a16="http://schemas.microsoft.com/office/drawing/2014/main" id="{6C7E5E03-C783-4987-9729-AE3206044955}"/>
+              </a:ext>
+            </a:extLst>
+          </p:cNvPr>
+          <p:cNvSpPr/>
+          <p:nvPr/>
+        </p:nvSpPr>
+        <p:spPr>
+          <a:xfrm rot="5400000">
+            <a:off x="-490479" y="3834478"/>
+            <a:ext cx="4596131" cy="584775"/>
+          </a:xfrm>
+          <a:prstGeom prst="rect">
+            <a:avLst/>
+          </a:prstGeom>
+          <a:noFill/>
+        </p:spPr>
+        <p:txBody>
+          <a:bodyPr wrap="none" lIns="91440" tIns="45720" rIns="91440" bIns="45720">
+            <a:spAutoFit/>
+          </a:bodyPr>
+          <a:lstStyle/>
+          <a:p>
+            <a:pPr algn="ctr"/>
+            <a:r>
+              <a:rPr lang="en-US" sz="3200" b="1" cap="none" spc="0" dirty="0">
+                <a:ln w="9525">
+                  <a:solidFill>
+                    <a:schemeClr val="bg1"/>
+                  </a:solidFill>
+                  <a:prstDash val="solid"/>
+                </a:ln>
+                <a:solidFill>
+                  <a:schemeClr val="tx1"/>
+                </a:solidFill>
+                <a:effectLst>
+                  <a:outerShdw blurRad="12700" dist="38100" dir="2700000" algn="tl" rotWithShape="0">
+                    <a:schemeClr val="bg1">
+                      <a:lumMod val="50000"/>
+                    </a:schemeClr>
+                  </a:outerShdw>
+                </a:effectLst>
+                <a:latin typeface="Code 7x5" panose="00000400000000000000" pitchFamily="2" charset="0"/>
+              </a:rPr>
+              <a:t>VERTICAL SLOT</a:t>
+            </a:r>
           </a:p>
         </p:txBody>
       </p:sp>
@@ -5795,7 +5868,7 @@
           <a:p>
             <a:r>
               <a:rPr lang="en-US" dirty="0"/>
-              <a:t>You have approximately a dozen Tuesdays in the pre-season left</a:t>
+              <a:t>You have approximately ten Tuesdays in the pre-season left</a:t>
             </a:r>
           </a:p>
           <a:p>
@@ -6972,12 +7045,139 @@
 </file>
 
 <file path=customXml/item1.xml><?xml version="1.0" encoding="utf-8"?>
-<?mso-contentType ?>
-<FormTemplates xmlns="http://schemas.microsoft.com/sharepoint/v3/contenttype/forms">
-  <Display>DocumentLibraryForm</Display>
-  <Edit>AssetEditForm</Edit>
-  <New>DocumentLibraryForm</New>
-</FormTemplates>
+<p:properties xmlns:p="http://schemas.microsoft.com/office/2006/metadata/properties" xmlns:xsi="http://www.w3.org/2001/XMLSchema-instance" xmlns:pc="http://schemas.microsoft.com/office/infopath/2007/PartnerControls">
+  <documentManagement>
+    <LocPublishedLinkedAssetsLookup xmlns="4873beb7-5857-4685-be1f-d57550cc96cc" xsi:nil="true"/>
+    <ApprovalStatus xmlns="4873beb7-5857-4685-be1f-d57550cc96cc">InProgress</ApprovalStatus>
+    <MarketSpecific xmlns="4873beb7-5857-4685-be1f-d57550cc96cc">false</MarketSpecific>
+    <LocComments xmlns="4873beb7-5857-4685-be1f-d57550cc96cc" xsi:nil="true"/>
+    <LocLastLocAttemptVersionTypeLookup xmlns="4873beb7-5857-4685-be1f-d57550cc96cc" xsi:nil="true"/>
+    <DirectSourceMarket xmlns="4873beb7-5857-4685-be1f-d57550cc96cc" xsi:nil="true"/>
+    <ThumbnailAssetId xmlns="4873beb7-5857-4685-be1f-d57550cc96cc" xsi:nil="true"/>
+    <PrimaryImageGen xmlns="4873beb7-5857-4685-be1f-d57550cc96cc">false</PrimaryImageGen>
+    <LocNewPublishedVersionLookup xmlns="4873beb7-5857-4685-be1f-d57550cc96cc" xsi:nil="true"/>
+    <LegacyData xmlns="4873beb7-5857-4685-be1f-d57550cc96cc" xsi:nil="true"/>
+    <LocRecommendedHandoff xmlns="4873beb7-5857-4685-be1f-d57550cc96cc" xsi:nil="true"/>
+    <BusinessGroup xmlns="4873beb7-5857-4685-be1f-d57550cc96cc" xsi:nil="true"/>
+    <BlockPublish xmlns="4873beb7-5857-4685-be1f-d57550cc96cc">false</BlockPublish>
+    <TPFriendlyName xmlns="4873beb7-5857-4685-be1f-d57550cc96cc" xsi:nil="true"/>
+    <LocOverallPublishStatusLookup xmlns="4873beb7-5857-4685-be1f-d57550cc96cc" xsi:nil="true"/>
+    <NumericId xmlns="4873beb7-5857-4685-be1f-d57550cc96cc" xsi:nil="true"/>
+    <APEditor xmlns="4873beb7-5857-4685-be1f-d57550cc96cc">
+      <UserInfo>
+        <DisplayName/>
+        <AccountId xsi:nil="true"/>
+        <AccountType/>
+      </UserInfo>
+    </APEditor>
+    <SourceTitle xmlns="4873beb7-5857-4685-be1f-d57550cc96cc" xsi:nil="true"/>
+    <OpenTemplate xmlns="4873beb7-5857-4685-be1f-d57550cc96cc">true</OpenTemplate>
+    <LocOverallLocStatusLookup xmlns="4873beb7-5857-4685-be1f-d57550cc96cc" xsi:nil="true"/>
+    <UALocComments xmlns="4873beb7-5857-4685-be1f-d57550cc96cc" xsi:nil="true"/>
+    <ParentAssetId xmlns="4873beb7-5857-4685-be1f-d57550cc96cc" xsi:nil="true"/>
+    <IntlLangReviewDate xmlns="4873beb7-5857-4685-be1f-d57550cc96cc" xsi:nil="true"/>
+    <FeatureTagsTaxHTField0 xmlns="4873beb7-5857-4685-be1f-d57550cc96cc">
+      <Terms xmlns="http://schemas.microsoft.com/office/infopath/2007/PartnerControls"/>
+    </FeatureTagsTaxHTField0>
+    <PublishStatusLookup xmlns="4873beb7-5857-4685-be1f-d57550cc96cc">
+      <Value>1345093</Value>
+    </PublishStatusLookup>
+    <Providers xmlns="4873beb7-5857-4685-be1f-d57550cc96cc" xsi:nil="true"/>
+    <MachineTranslated xmlns="4873beb7-5857-4685-be1f-d57550cc96cc">false</MachineTranslated>
+    <OriginalSourceMarket xmlns="4873beb7-5857-4685-be1f-d57550cc96cc" xsi:nil="true"/>
+    <APDescription xmlns="4873beb7-5857-4685-be1f-d57550cc96cc">This simple template design works for technology and  businesses, but it's versatile enough to use in other contexts.  It features multiple slide layouts designed for widescreen (16x9 resolution) and includes a sample SmartArt list and chart that are easily editable.</APDescription>
+    <ClipArtFilename xmlns="4873beb7-5857-4685-be1f-d57550cc96cc" xsi:nil="true"/>
+    <ContentItem xmlns="4873beb7-5857-4685-be1f-d57550cc96cc" xsi:nil="true"/>
+    <TPInstallLocation xmlns="4873beb7-5857-4685-be1f-d57550cc96cc" xsi:nil="true"/>
+    <PublishTargets xmlns="4873beb7-5857-4685-be1f-d57550cc96cc">OfficeOnlineVNext</PublishTargets>
+    <TimesCloned xmlns="4873beb7-5857-4685-be1f-d57550cc96cc" xsi:nil="true"/>
+    <AssetStart xmlns="4873beb7-5857-4685-be1f-d57550cc96cc">2011-11-26T00:30:00+00:00</AssetStart>
+    <Provider xmlns="4873beb7-5857-4685-be1f-d57550cc96cc" xsi:nil="true"/>
+    <AcquiredFrom xmlns="4873beb7-5857-4685-be1f-d57550cc96cc">Internal MS</AcquiredFrom>
+    <FriendlyTitle xmlns="4873beb7-5857-4685-be1f-d57550cc96cc" xsi:nil="true"/>
+    <LastHandOff xmlns="4873beb7-5857-4685-be1f-d57550cc96cc" xsi:nil="true"/>
+    <TPClientViewer xmlns="4873beb7-5857-4685-be1f-d57550cc96cc" xsi:nil="true"/>
+    <TemplateStatus xmlns="4873beb7-5857-4685-be1f-d57550cc96cc">Complete</TemplateStatus>
+    <Downloads xmlns="4873beb7-5857-4685-be1f-d57550cc96cc">0</Downloads>
+    <OOCacheId xmlns="4873beb7-5857-4685-be1f-d57550cc96cc" xsi:nil="true"/>
+    <IsDeleted xmlns="4873beb7-5857-4685-be1f-d57550cc96cc">false</IsDeleted>
+    <LocPublishedDependentAssetsLookup xmlns="4873beb7-5857-4685-be1f-d57550cc96cc" xsi:nil="true"/>
+    <TPExecutable xmlns="4873beb7-5857-4685-be1f-d57550cc96cc" xsi:nil="true"/>
+    <EditorialTags xmlns="4873beb7-5857-4685-be1f-d57550cc96cc" xsi:nil="true"/>
+    <SubmitterId xmlns="4873beb7-5857-4685-be1f-d57550cc96cc" xsi:nil="true"/>
+    <ApprovalLog xmlns="4873beb7-5857-4685-be1f-d57550cc96cc" xsi:nil="true"/>
+    <AssetType xmlns="4873beb7-5857-4685-be1f-d57550cc96cc">TP</AssetType>
+    <BugNumber xmlns="4873beb7-5857-4685-be1f-d57550cc96cc" xsi:nil="true"/>
+    <CSXSubmissionDate xmlns="4873beb7-5857-4685-be1f-d57550cc96cc" xsi:nil="true"/>
+    <CSXUpdate xmlns="4873beb7-5857-4685-be1f-d57550cc96cc">false</CSXUpdate>
+    <Milestone xmlns="4873beb7-5857-4685-be1f-d57550cc96cc" xsi:nil="true"/>
+    <RecommendationsModifier xmlns="4873beb7-5857-4685-be1f-d57550cc96cc" xsi:nil="true"/>
+    <OriginAsset xmlns="4873beb7-5857-4685-be1f-d57550cc96cc" xsi:nil="true"/>
+    <TPComponent xmlns="4873beb7-5857-4685-be1f-d57550cc96cc" xsi:nil="true"/>
+    <AssetId xmlns="4873beb7-5857-4685-be1f-d57550cc96cc">TP102787989</AssetId>
+    <IntlLocPriority xmlns="4873beb7-5857-4685-be1f-d57550cc96cc" xsi:nil="true"/>
+    <PolicheckWords xmlns="4873beb7-5857-4685-be1f-d57550cc96cc" xsi:nil="true"/>
+    <TPLaunchHelpLink xmlns="4873beb7-5857-4685-be1f-d57550cc96cc" xsi:nil="true"/>
+    <TPApplication xmlns="4873beb7-5857-4685-be1f-d57550cc96cc" xsi:nil="true"/>
+    <CrawlForDependencies xmlns="4873beb7-5857-4685-be1f-d57550cc96cc">false</CrawlForDependencies>
+    <HandoffToMSDN xmlns="4873beb7-5857-4685-be1f-d57550cc96cc" xsi:nil="true"/>
+    <PlannedPubDate xmlns="4873beb7-5857-4685-be1f-d57550cc96cc" xsi:nil="true"/>
+    <IntlLangReviewer xmlns="4873beb7-5857-4685-be1f-d57550cc96cc" xsi:nil="true"/>
+    <TrustLevel xmlns="4873beb7-5857-4685-be1f-d57550cc96cc">1 Microsoft Managed Content</TrustLevel>
+    <LocLastLocAttemptVersionLookup xmlns="4873beb7-5857-4685-be1f-d57550cc96cc">694266</LocLastLocAttemptVersionLookup>
+    <LocProcessedForHandoffsLookup xmlns="4873beb7-5857-4685-be1f-d57550cc96cc" xsi:nil="true"/>
+    <IsSearchable xmlns="4873beb7-5857-4685-be1f-d57550cc96cc">true</IsSearchable>
+    <TemplateTemplateType xmlns="4873beb7-5857-4685-be1f-d57550cc96cc">PowerPoint Presentation Template</TemplateTemplateType>
+    <CampaignTagsTaxHTField0 xmlns="4873beb7-5857-4685-be1f-d57550cc96cc">
+      <Terms xmlns="http://schemas.microsoft.com/office/infopath/2007/PartnerControls"/>
+    </CampaignTagsTaxHTField0>
+    <TPNamespace xmlns="4873beb7-5857-4685-be1f-d57550cc96cc" xsi:nil="true"/>
+    <LocOverallPreviewStatusLookup xmlns="4873beb7-5857-4685-be1f-d57550cc96cc" xsi:nil="true"/>
+    <TaxCatchAll xmlns="4873beb7-5857-4685-be1f-d57550cc96cc"/>
+    <Markets xmlns="4873beb7-5857-4685-be1f-d57550cc96cc"/>
+    <UAProjectedTotalWords xmlns="4873beb7-5857-4685-be1f-d57550cc96cc" xsi:nil="true"/>
+    <IntlLangReview xmlns="4873beb7-5857-4685-be1f-d57550cc96cc" xsi:nil="true"/>
+    <OutputCachingOn xmlns="4873beb7-5857-4685-be1f-d57550cc96cc">false</OutputCachingOn>
+    <AverageRating xmlns="4873beb7-5857-4685-be1f-d57550cc96cc" xsi:nil="true"/>
+    <APAuthor xmlns="4873beb7-5857-4685-be1f-d57550cc96cc">
+      <UserInfo>
+        <DisplayName>REDMOND\kristaa</DisplayName>
+        <AccountId>136</AccountId>
+        <AccountType/>
+      </UserInfo>
+    </APAuthor>
+    <LocManualTestRequired xmlns="4873beb7-5857-4685-be1f-d57550cc96cc">false</LocManualTestRequired>
+    <TPCommandLine xmlns="4873beb7-5857-4685-be1f-d57550cc96cc" xsi:nil="true"/>
+    <TPAppVersion xmlns="4873beb7-5857-4685-be1f-d57550cc96cc" xsi:nil="true"/>
+    <EditorialStatus xmlns="4873beb7-5857-4685-be1f-d57550cc96cc">Complete</EditorialStatus>
+    <LastModifiedDateTime xmlns="4873beb7-5857-4685-be1f-d57550cc96cc" xsi:nil="true"/>
+    <ScenarioTagsTaxHTField0 xmlns="4873beb7-5857-4685-be1f-d57550cc96cc">
+      <Terms xmlns="http://schemas.microsoft.com/office/infopath/2007/PartnerControls"/>
+    </ScenarioTagsTaxHTField0>
+    <LocProcessedForMarketsLookup xmlns="4873beb7-5857-4685-be1f-d57550cc96cc" xsi:nil="true"/>
+    <TPLaunchHelpLinkType xmlns="4873beb7-5857-4685-be1f-d57550cc96cc">Template</TPLaunchHelpLinkType>
+    <OriginalRelease xmlns="4873beb7-5857-4685-be1f-d57550cc96cc">15</OriginalRelease>
+    <LocalizationTagsTaxHTField0 xmlns="4873beb7-5857-4685-be1f-d57550cc96cc">
+      <Terms xmlns="http://schemas.microsoft.com/office/infopath/2007/PartnerControls"/>
+    </LocalizationTagsTaxHTField0>
+    <UACurrentWords xmlns="4873beb7-5857-4685-be1f-d57550cc96cc" xsi:nil="true"/>
+    <ArtSampleDocs xmlns="4873beb7-5857-4685-be1f-d57550cc96cc" xsi:nil="true"/>
+    <UALocRecommendation xmlns="4873beb7-5857-4685-be1f-d57550cc96cc">Localize</UALocRecommendation>
+    <Manager xmlns="4873beb7-5857-4685-be1f-d57550cc96cc" xsi:nil="true"/>
+    <LocOverallHandbackStatusLookup xmlns="4873beb7-5857-4685-be1f-d57550cc96cc" xsi:nil="true"/>
+    <ShowIn xmlns="4873beb7-5857-4685-be1f-d57550cc96cc">Show everywhere</ShowIn>
+    <UANotes xmlns="4873beb7-5857-4685-be1f-d57550cc96cc" xsi:nil="true"/>
+    <InternalTagsTaxHTField0 xmlns="4873beb7-5857-4685-be1f-d57550cc96cc">
+      <Terms xmlns="http://schemas.microsoft.com/office/infopath/2007/PartnerControls"/>
+    </InternalTagsTaxHTField0>
+    <CSXHash xmlns="4873beb7-5857-4685-be1f-d57550cc96cc" xsi:nil="true"/>
+    <VoteCount xmlns="4873beb7-5857-4685-be1f-d57550cc96cc" xsi:nil="true"/>
+    <AssetExpire xmlns="4873beb7-5857-4685-be1f-d57550cc96cc">2029-05-12T07:00:00+00:00</AssetExpire>
+    <DSATActionTaken xmlns="4873beb7-5857-4685-be1f-d57550cc96cc" xsi:nil="true"/>
+    <CSXSubmissionMarket xmlns="4873beb7-5857-4685-be1f-d57550cc96cc" xsi:nil="true"/>
+    <LocMarketGroupTiers2 xmlns="4873beb7-5857-4685-be1f-d57550cc96cc" xsi:nil="true"/>
+  </documentManagement>
+</p:properties>
 </file>
 
 <file path=customXml/item2.xml><?xml version="1.0" encoding="utf-8"?>
@@ -8021,145 +8221,26 @@
 </file>
 
 <file path=customXml/item3.xml><?xml version="1.0" encoding="utf-8"?>
-<p:properties xmlns:p="http://schemas.microsoft.com/office/2006/metadata/properties" xmlns:xsi="http://www.w3.org/2001/XMLSchema-instance" xmlns:pc="http://schemas.microsoft.com/office/infopath/2007/PartnerControls">
-  <documentManagement>
-    <LocPublishedLinkedAssetsLookup xmlns="4873beb7-5857-4685-be1f-d57550cc96cc" xsi:nil="true"/>
-    <ApprovalStatus xmlns="4873beb7-5857-4685-be1f-d57550cc96cc">InProgress</ApprovalStatus>
-    <MarketSpecific xmlns="4873beb7-5857-4685-be1f-d57550cc96cc">false</MarketSpecific>
-    <LocComments xmlns="4873beb7-5857-4685-be1f-d57550cc96cc" xsi:nil="true"/>
-    <LocLastLocAttemptVersionTypeLookup xmlns="4873beb7-5857-4685-be1f-d57550cc96cc" xsi:nil="true"/>
-    <DirectSourceMarket xmlns="4873beb7-5857-4685-be1f-d57550cc96cc" xsi:nil="true"/>
-    <ThumbnailAssetId xmlns="4873beb7-5857-4685-be1f-d57550cc96cc" xsi:nil="true"/>
-    <PrimaryImageGen xmlns="4873beb7-5857-4685-be1f-d57550cc96cc">false</PrimaryImageGen>
-    <LocNewPublishedVersionLookup xmlns="4873beb7-5857-4685-be1f-d57550cc96cc" xsi:nil="true"/>
-    <LegacyData xmlns="4873beb7-5857-4685-be1f-d57550cc96cc" xsi:nil="true"/>
-    <LocRecommendedHandoff xmlns="4873beb7-5857-4685-be1f-d57550cc96cc" xsi:nil="true"/>
-    <BusinessGroup xmlns="4873beb7-5857-4685-be1f-d57550cc96cc" xsi:nil="true"/>
-    <BlockPublish xmlns="4873beb7-5857-4685-be1f-d57550cc96cc">false</BlockPublish>
-    <TPFriendlyName xmlns="4873beb7-5857-4685-be1f-d57550cc96cc" xsi:nil="true"/>
-    <LocOverallPublishStatusLookup xmlns="4873beb7-5857-4685-be1f-d57550cc96cc" xsi:nil="true"/>
-    <NumericId xmlns="4873beb7-5857-4685-be1f-d57550cc96cc" xsi:nil="true"/>
-    <APEditor xmlns="4873beb7-5857-4685-be1f-d57550cc96cc">
-      <UserInfo>
-        <DisplayName/>
-        <AccountId xsi:nil="true"/>
-        <AccountType/>
-      </UserInfo>
-    </APEditor>
-    <SourceTitle xmlns="4873beb7-5857-4685-be1f-d57550cc96cc" xsi:nil="true"/>
-    <OpenTemplate xmlns="4873beb7-5857-4685-be1f-d57550cc96cc">true</OpenTemplate>
-    <LocOverallLocStatusLookup xmlns="4873beb7-5857-4685-be1f-d57550cc96cc" xsi:nil="true"/>
-    <UALocComments xmlns="4873beb7-5857-4685-be1f-d57550cc96cc" xsi:nil="true"/>
-    <ParentAssetId xmlns="4873beb7-5857-4685-be1f-d57550cc96cc" xsi:nil="true"/>
-    <IntlLangReviewDate xmlns="4873beb7-5857-4685-be1f-d57550cc96cc" xsi:nil="true"/>
-    <FeatureTagsTaxHTField0 xmlns="4873beb7-5857-4685-be1f-d57550cc96cc">
-      <Terms xmlns="http://schemas.microsoft.com/office/infopath/2007/PartnerControls"/>
-    </FeatureTagsTaxHTField0>
-    <PublishStatusLookup xmlns="4873beb7-5857-4685-be1f-d57550cc96cc">
-      <Value>1345093</Value>
-    </PublishStatusLookup>
-    <Providers xmlns="4873beb7-5857-4685-be1f-d57550cc96cc" xsi:nil="true"/>
-    <MachineTranslated xmlns="4873beb7-5857-4685-be1f-d57550cc96cc">false</MachineTranslated>
-    <OriginalSourceMarket xmlns="4873beb7-5857-4685-be1f-d57550cc96cc" xsi:nil="true"/>
-    <APDescription xmlns="4873beb7-5857-4685-be1f-d57550cc96cc">This simple template design works for technology and  businesses, but it's versatile enough to use in other contexts.  It features multiple slide layouts designed for widescreen (16x9 resolution) and includes a sample SmartArt list and chart that are easily editable.</APDescription>
-    <ClipArtFilename xmlns="4873beb7-5857-4685-be1f-d57550cc96cc" xsi:nil="true"/>
-    <ContentItem xmlns="4873beb7-5857-4685-be1f-d57550cc96cc" xsi:nil="true"/>
-    <TPInstallLocation xmlns="4873beb7-5857-4685-be1f-d57550cc96cc" xsi:nil="true"/>
-    <PublishTargets xmlns="4873beb7-5857-4685-be1f-d57550cc96cc">OfficeOnlineVNext</PublishTargets>
-    <TimesCloned xmlns="4873beb7-5857-4685-be1f-d57550cc96cc" xsi:nil="true"/>
-    <AssetStart xmlns="4873beb7-5857-4685-be1f-d57550cc96cc">2011-11-26T00:30:00+00:00</AssetStart>
-    <Provider xmlns="4873beb7-5857-4685-be1f-d57550cc96cc" xsi:nil="true"/>
-    <AcquiredFrom xmlns="4873beb7-5857-4685-be1f-d57550cc96cc">Internal MS</AcquiredFrom>
-    <FriendlyTitle xmlns="4873beb7-5857-4685-be1f-d57550cc96cc" xsi:nil="true"/>
-    <LastHandOff xmlns="4873beb7-5857-4685-be1f-d57550cc96cc" xsi:nil="true"/>
-    <TPClientViewer xmlns="4873beb7-5857-4685-be1f-d57550cc96cc" xsi:nil="true"/>
-    <TemplateStatus xmlns="4873beb7-5857-4685-be1f-d57550cc96cc">Complete</TemplateStatus>
-    <Downloads xmlns="4873beb7-5857-4685-be1f-d57550cc96cc">0</Downloads>
-    <OOCacheId xmlns="4873beb7-5857-4685-be1f-d57550cc96cc" xsi:nil="true"/>
-    <IsDeleted xmlns="4873beb7-5857-4685-be1f-d57550cc96cc">false</IsDeleted>
-    <LocPublishedDependentAssetsLookup xmlns="4873beb7-5857-4685-be1f-d57550cc96cc" xsi:nil="true"/>
-    <TPExecutable xmlns="4873beb7-5857-4685-be1f-d57550cc96cc" xsi:nil="true"/>
-    <EditorialTags xmlns="4873beb7-5857-4685-be1f-d57550cc96cc" xsi:nil="true"/>
-    <SubmitterId xmlns="4873beb7-5857-4685-be1f-d57550cc96cc" xsi:nil="true"/>
-    <ApprovalLog xmlns="4873beb7-5857-4685-be1f-d57550cc96cc" xsi:nil="true"/>
-    <AssetType xmlns="4873beb7-5857-4685-be1f-d57550cc96cc">TP</AssetType>
-    <BugNumber xmlns="4873beb7-5857-4685-be1f-d57550cc96cc" xsi:nil="true"/>
-    <CSXSubmissionDate xmlns="4873beb7-5857-4685-be1f-d57550cc96cc" xsi:nil="true"/>
-    <CSXUpdate xmlns="4873beb7-5857-4685-be1f-d57550cc96cc">false</CSXUpdate>
-    <Milestone xmlns="4873beb7-5857-4685-be1f-d57550cc96cc" xsi:nil="true"/>
-    <RecommendationsModifier xmlns="4873beb7-5857-4685-be1f-d57550cc96cc" xsi:nil="true"/>
-    <OriginAsset xmlns="4873beb7-5857-4685-be1f-d57550cc96cc" xsi:nil="true"/>
-    <TPComponent xmlns="4873beb7-5857-4685-be1f-d57550cc96cc" xsi:nil="true"/>
-    <AssetId xmlns="4873beb7-5857-4685-be1f-d57550cc96cc">TP102787989</AssetId>
-    <IntlLocPriority xmlns="4873beb7-5857-4685-be1f-d57550cc96cc" xsi:nil="true"/>
-    <PolicheckWords xmlns="4873beb7-5857-4685-be1f-d57550cc96cc" xsi:nil="true"/>
-    <TPLaunchHelpLink xmlns="4873beb7-5857-4685-be1f-d57550cc96cc" xsi:nil="true"/>
-    <TPApplication xmlns="4873beb7-5857-4685-be1f-d57550cc96cc" xsi:nil="true"/>
-    <CrawlForDependencies xmlns="4873beb7-5857-4685-be1f-d57550cc96cc">false</CrawlForDependencies>
-    <HandoffToMSDN xmlns="4873beb7-5857-4685-be1f-d57550cc96cc" xsi:nil="true"/>
-    <PlannedPubDate xmlns="4873beb7-5857-4685-be1f-d57550cc96cc" xsi:nil="true"/>
-    <IntlLangReviewer xmlns="4873beb7-5857-4685-be1f-d57550cc96cc" xsi:nil="true"/>
-    <TrustLevel xmlns="4873beb7-5857-4685-be1f-d57550cc96cc">1 Microsoft Managed Content</TrustLevel>
-    <LocLastLocAttemptVersionLookup xmlns="4873beb7-5857-4685-be1f-d57550cc96cc">694266</LocLastLocAttemptVersionLookup>
-    <LocProcessedForHandoffsLookup xmlns="4873beb7-5857-4685-be1f-d57550cc96cc" xsi:nil="true"/>
-    <IsSearchable xmlns="4873beb7-5857-4685-be1f-d57550cc96cc">true</IsSearchable>
-    <TemplateTemplateType xmlns="4873beb7-5857-4685-be1f-d57550cc96cc">PowerPoint Presentation Template</TemplateTemplateType>
-    <CampaignTagsTaxHTField0 xmlns="4873beb7-5857-4685-be1f-d57550cc96cc">
-      <Terms xmlns="http://schemas.microsoft.com/office/infopath/2007/PartnerControls"/>
-    </CampaignTagsTaxHTField0>
-    <TPNamespace xmlns="4873beb7-5857-4685-be1f-d57550cc96cc" xsi:nil="true"/>
-    <LocOverallPreviewStatusLookup xmlns="4873beb7-5857-4685-be1f-d57550cc96cc" xsi:nil="true"/>
-    <TaxCatchAll xmlns="4873beb7-5857-4685-be1f-d57550cc96cc"/>
-    <Markets xmlns="4873beb7-5857-4685-be1f-d57550cc96cc"/>
-    <UAProjectedTotalWords xmlns="4873beb7-5857-4685-be1f-d57550cc96cc" xsi:nil="true"/>
-    <IntlLangReview xmlns="4873beb7-5857-4685-be1f-d57550cc96cc" xsi:nil="true"/>
-    <OutputCachingOn xmlns="4873beb7-5857-4685-be1f-d57550cc96cc">false</OutputCachingOn>
-    <AverageRating xmlns="4873beb7-5857-4685-be1f-d57550cc96cc" xsi:nil="true"/>
-    <APAuthor xmlns="4873beb7-5857-4685-be1f-d57550cc96cc">
-      <UserInfo>
-        <DisplayName>REDMOND\kristaa</DisplayName>
-        <AccountId>136</AccountId>
-        <AccountType/>
-      </UserInfo>
-    </APAuthor>
-    <LocManualTestRequired xmlns="4873beb7-5857-4685-be1f-d57550cc96cc">false</LocManualTestRequired>
-    <TPCommandLine xmlns="4873beb7-5857-4685-be1f-d57550cc96cc" xsi:nil="true"/>
-    <TPAppVersion xmlns="4873beb7-5857-4685-be1f-d57550cc96cc" xsi:nil="true"/>
-    <EditorialStatus xmlns="4873beb7-5857-4685-be1f-d57550cc96cc">Complete</EditorialStatus>
-    <LastModifiedDateTime xmlns="4873beb7-5857-4685-be1f-d57550cc96cc" xsi:nil="true"/>
-    <ScenarioTagsTaxHTField0 xmlns="4873beb7-5857-4685-be1f-d57550cc96cc">
-      <Terms xmlns="http://schemas.microsoft.com/office/infopath/2007/PartnerControls"/>
-    </ScenarioTagsTaxHTField0>
-    <LocProcessedForMarketsLookup xmlns="4873beb7-5857-4685-be1f-d57550cc96cc" xsi:nil="true"/>
-    <TPLaunchHelpLinkType xmlns="4873beb7-5857-4685-be1f-d57550cc96cc">Template</TPLaunchHelpLinkType>
-    <OriginalRelease xmlns="4873beb7-5857-4685-be1f-d57550cc96cc">15</OriginalRelease>
-    <LocalizationTagsTaxHTField0 xmlns="4873beb7-5857-4685-be1f-d57550cc96cc">
-      <Terms xmlns="http://schemas.microsoft.com/office/infopath/2007/PartnerControls"/>
-    </LocalizationTagsTaxHTField0>
-    <UACurrentWords xmlns="4873beb7-5857-4685-be1f-d57550cc96cc" xsi:nil="true"/>
-    <ArtSampleDocs xmlns="4873beb7-5857-4685-be1f-d57550cc96cc" xsi:nil="true"/>
-    <UALocRecommendation xmlns="4873beb7-5857-4685-be1f-d57550cc96cc">Localize</UALocRecommendation>
-    <Manager xmlns="4873beb7-5857-4685-be1f-d57550cc96cc" xsi:nil="true"/>
-    <LocOverallHandbackStatusLookup xmlns="4873beb7-5857-4685-be1f-d57550cc96cc" xsi:nil="true"/>
-    <ShowIn xmlns="4873beb7-5857-4685-be1f-d57550cc96cc">Show everywhere</ShowIn>
-    <UANotes xmlns="4873beb7-5857-4685-be1f-d57550cc96cc" xsi:nil="true"/>
-    <InternalTagsTaxHTField0 xmlns="4873beb7-5857-4685-be1f-d57550cc96cc">
-      <Terms xmlns="http://schemas.microsoft.com/office/infopath/2007/PartnerControls"/>
-    </InternalTagsTaxHTField0>
-    <CSXHash xmlns="4873beb7-5857-4685-be1f-d57550cc96cc" xsi:nil="true"/>
-    <VoteCount xmlns="4873beb7-5857-4685-be1f-d57550cc96cc" xsi:nil="true"/>
-    <AssetExpire xmlns="4873beb7-5857-4685-be1f-d57550cc96cc">2029-05-12T07:00:00+00:00</AssetExpire>
-    <DSATActionTaken xmlns="4873beb7-5857-4685-be1f-d57550cc96cc" xsi:nil="true"/>
-    <CSXSubmissionMarket xmlns="4873beb7-5857-4685-be1f-d57550cc96cc" xsi:nil="true"/>
-    <LocMarketGroupTiers2 xmlns="4873beb7-5857-4685-be1f-d57550cc96cc" xsi:nil="true"/>
-  </documentManagement>
-</p:properties>
+<?mso-contentType ?>
+<FormTemplates xmlns="http://schemas.microsoft.com/sharepoint/v3/contenttype/forms">
+  <Display>DocumentLibraryForm</Display>
+  <Edit>AssetEditForm</Edit>
+  <New>DocumentLibraryForm</New>
+</FormTemplates>
 </file>
 
 <file path=customXml/itemProps1.xml><?xml version="1.0" encoding="utf-8"?>
-<ds:datastoreItem xmlns:ds="http://schemas.openxmlformats.org/officeDocument/2006/customXml" ds:itemID="{3836F65B-1B07-41EE-A0E8-BC6EF3855225}">
+<ds:datastoreItem xmlns:ds="http://schemas.openxmlformats.org/officeDocument/2006/customXml" ds:itemID="{60C67BEE-D13F-4BD2-98A5-34D8A0977F68}">
   <ds:schemaRefs>
-    <ds:schemaRef ds:uri="http://schemas.microsoft.com/sharepoint/v3/contenttype/forms"/>
+    <ds:schemaRef ds:uri="4873beb7-5857-4685-be1f-d57550cc96cc"/>
+    <ds:schemaRef ds:uri="http://schemas.openxmlformats.org/package/2006/metadata/core-properties"/>
+    <ds:schemaRef ds:uri="http://purl.org/dc/terms/"/>
+    <ds:schemaRef ds:uri="http://schemas.microsoft.com/office/2006/documentManagement/types"/>
+    <ds:schemaRef ds:uri="http://purl.org/dc/elements/1.1/"/>
+    <ds:schemaRef ds:uri="http://schemas.microsoft.com/office/2006/metadata/properties"/>
+    <ds:schemaRef ds:uri="http://schemas.microsoft.com/office/infopath/2007/PartnerControls"/>
+    <ds:schemaRef ds:uri="http://www.w3.org/XML/1998/namespace"/>
+    <ds:schemaRef ds:uri="http://purl.org/dc/dcmitype/"/>
   </ds:schemaRefs>
 </ds:datastoreItem>
 </file>
@@ -8183,17 +8264,9 @@
 </file>
 
 <file path=customXml/itemProps3.xml><?xml version="1.0" encoding="utf-8"?>
-<ds:datastoreItem xmlns:ds="http://schemas.openxmlformats.org/officeDocument/2006/customXml" ds:itemID="{60C67BEE-D13F-4BD2-98A5-34D8A0977F68}">
+<ds:datastoreItem xmlns:ds="http://schemas.openxmlformats.org/officeDocument/2006/customXml" ds:itemID="{3836F65B-1B07-41EE-A0E8-BC6EF3855225}">
   <ds:schemaRefs>
-    <ds:schemaRef ds:uri="4873beb7-5857-4685-be1f-d57550cc96cc"/>
-    <ds:schemaRef ds:uri="http://schemas.openxmlformats.org/package/2006/metadata/core-properties"/>
-    <ds:schemaRef ds:uri="http://purl.org/dc/terms/"/>
-    <ds:schemaRef ds:uri="http://schemas.microsoft.com/office/2006/documentManagement/types"/>
-    <ds:schemaRef ds:uri="http://purl.org/dc/elements/1.1/"/>
-    <ds:schemaRef ds:uri="http://schemas.microsoft.com/office/2006/metadata/properties"/>
-    <ds:schemaRef ds:uri="http://schemas.microsoft.com/office/infopath/2007/PartnerControls"/>
-    <ds:schemaRef ds:uri="http://www.w3.org/XML/1998/namespace"/>
-    <ds:schemaRef ds:uri="http://purl.org/dc/dcmitype/"/>
+    <ds:schemaRef ds:uri="http://schemas.microsoft.com/sharepoint/v3/contenttype/forms"/>
   </ds:schemaRefs>
 </ds:datastoreItem>
 </file>
</xml_diff>